<commit_message>
feat: finish module 6
</commit_message>
<xml_diff>
--- a/Unidad_6/Presentación.pptx
+++ b/Unidad_6/Presentación.pptx
@@ -5,10 +5,13 @@
     <p:sldMasterId id="2147483648" r:id="rId4"/>
   </p:sldMasterIdLst>
   <p:notesMasterIdLst>
-    <p:notesMasterId r:id="rId6"/>
+    <p:notesMasterId r:id="rId9"/>
   </p:notesMasterIdLst>
   <p:sldIdLst>
     <p:sldId id="256" r:id="rId5"/>
+    <p:sldId id="257" r:id="rId6"/>
+    <p:sldId id="258" r:id="rId7"/>
+    <p:sldId id="259" r:id="rId8"/>
   </p:sldIdLst>
   <p:sldSz cx="12192000" cy="6858000"/>
   <p:notesSz cx="6858000" cy="9144000"/>
@@ -3902,6 +3905,408 @@
     <p:extLst>
       <p:ext uri="{BB962C8B-B14F-4D97-AF65-F5344CB8AC3E}">
         <p14:creationId xmlns:p14="http://schemas.microsoft.com/office/powerpoint/2010/main" val="2934771278"/>
+      </p:ext>
+    </p:extLst>
+  </p:cSld>
+  <p:clrMapOvr>
+    <a:masterClrMapping/>
+  </p:clrMapOvr>
+</p:sld>
+</file>
+
+<file path=ppt/slides/slide2.xml><?xml version="1.0" encoding="utf-8"?>
+<p:sld xmlns:a="http://schemas.openxmlformats.org/drawingml/2006/main" xmlns:r="http://schemas.openxmlformats.org/officeDocument/2006/relationships" xmlns:p="http://schemas.openxmlformats.org/presentationml/2006/main">
+  <p:cSld>
+    <p:spTree>
+      <p:nvGrpSpPr>
+        <p:cNvPr id="1" name=""/>
+        <p:cNvGrpSpPr/>
+        <p:nvPr/>
+      </p:nvGrpSpPr>
+      <p:grpSpPr>
+        <a:xfrm>
+          <a:off x="0" y="0"/>
+          <a:ext cx="0" cy="0"/>
+          <a:chOff x="0" y="0"/>
+          <a:chExt cx="0" cy="0"/>
+        </a:xfrm>
+      </p:grpSpPr>
+      <p:sp>
+        <p:nvSpPr>
+          <p:cNvPr id="2" name="Title 1">
+            <a:extLst>
+              <a:ext uri="{FF2B5EF4-FFF2-40B4-BE49-F238E27FC236}">
+                <a16:creationId xmlns:a16="http://schemas.microsoft.com/office/drawing/2014/main" id="{CCD0B4F3-D1ED-E439-37BB-96BE256757C7}"/>
+              </a:ext>
+            </a:extLst>
+          </p:cNvPr>
+          <p:cNvSpPr>
+            <a:spLocks noGrp="1"/>
+          </p:cNvSpPr>
+          <p:nvPr>
+            <p:ph type="title"/>
+          </p:nvPr>
+        </p:nvSpPr>
+        <p:spPr/>
+        <p:txBody>
+          <a:bodyPr/>
+          <a:lstStyle/>
+          <a:p>
+            <a:r>
+              <a:rPr lang="en-US" dirty="0"/>
+              <a:t>¿</a:t>
+            </a:r>
+            <a:r>
+              <a:rPr lang="en-US" dirty="0" err="1"/>
+              <a:t>Qué</a:t>
+            </a:r>
+            <a:r>
+              <a:rPr lang="en-US" dirty="0"/>
+              <a:t> es Global State?</a:t>
+            </a:r>
+            <a:endParaRPr lang="es-EC" dirty="0"/>
+          </a:p>
+        </p:txBody>
+      </p:sp>
+    </p:spTree>
+    <p:extLst>
+      <p:ext uri="{BB962C8B-B14F-4D97-AF65-F5344CB8AC3E}">
+        <p14:creationId xmlns:p14="http://schemas.microsoft.com/office/powerpoint/2010/main" val="875802042"/>
+      </p:ext>
+    </p:extLst>
+  </p:cSld>
+  <p:clrMapOvr>
+    <a:masterClrMapping/>
+  </p:clrMapOvr>
+</p:sld>
+</file>
+
+<file path=ppt/slides/slide3.xml><?xml version="1.0" encoding="utf-8"?>
+<p:sld xmlns:a="http://schemas.openxmlformats.org/drawingml/2006/main" xmlns:r="http://schemas.openxmlformats.org/officeDocument/2006/relationships" xmlns:p="http://schemas.openxmlformats.org/presentationml/2006/main">
+  <p:cSld>
+    <p:spTree>
+      <p:nvGrpSpPr>
+        <p:cNvPr id="1" name=""/>
+        <p:cNvGrpSpPr/>
+        <p:nvPr/>
+      </p:nvGrpSpPr>
+      <p:grpSpPr>
+        <a:xfrm>
+          <a:off x="0" y="0"/>
+          <a:ext cx="0" cy="0"/>
+          <a:chOff x="0" y="0"/>
+          <a:chExt cx="0" cy="0"/>
+        </a:xfrm>
+      </p:grpSpPr>
+      <p:sp>
+        <p:nvSpPr>
+          <p:cNvPr id="2" name="Title 1">
+            <a:extLst>
+              <a:ext uri="{FF2B5EF4-FFF2-40B4-BE49-F238E27FC236}">
+                <a16:creationId xmlns:a16="http://schemas.microsoft.com/office/drawing/2014/main" id="{17E93DD5-6A76-7716-329D-0D0AC096D81A}"/>
+              </a:ext>
+            </a:extLst>
+          </p:cNvPr>
+          <p:cNvSpPr>
+            <a:spLocks noGrp="1"/>
+          </p:cNvSpPr>
+          <p:nvPr>
+            <p:ph type="ctrTitle"/>
+          </p:nvPr>
+        </p:nvSpPr>
+        <p:spPr/>
+        <p:txBody>
+          <a:bodyPr/>
+          <a:lstStyle/>
+          <a:p>
+            <a:r>
+              <a:rPr lang="en-US" dirty="0"/>
+              <a:t>¿Por </a:t>
+            </a:r>
+            <a:r>
+              <a:rPr lang="en-US" dirty="0" err="1"/>
+              <a:t>qué</a:t>
+            </a:r>
+            <a:r>
+              <a:rPr lang="en-US" dirty="0"/>
+              <a:t> </a:t>
+            </a:r>
+            <a:r>
+              <a:rPr lang="en-US" dirty="0" err="1"/>
+              <a:t>usarlo</a:t>
+            </a:r>
+            <a:r>
+              <a:rPr lang="en-US" dirty="0"/>
+              <a:t>?</a:t>
+            </a:r>
+            <a:endParaRPr lang="es-EC" dirty="0"/>
+          </a:p>
+        </p:txBody>
+      </p:sp>
+      <p:sp>
+        <p:nvSpPr>
+          <p:cNvPr id="3" name="Subtitle 2">
+            <a:extLst>
+              <a:ext uri="{FF2B5EF4-FFF2-40B4-BE49-F238E27FC236}">
+                <a16:creationId xmlns:a16="http://schemas.microsoft.com/office/drawing/2014/main" id="{1A05EB60-D859-1341-63DF-541734F7F02C}"/>
+              </a:ext>
+            </a:extLst>
+          </p:cNvPr>
+          <p:cNvSpPr>
+            <a:spLocks noGrp="1"/>
+          </p:cNvSpPr>
+          <p:nvPr>
+            <p:ph type="subTitle" idx="1"/>
+          </p:nvPr>
+        </p:nvSpPr>
+        <p:spPr/>
+        <p:txBody>
+          <a:bodyPr/>
+          <a:lstStyle/>
+          <a:p>
+            <a:pPr marL="342900" indent="-342900" algn="l">
+              <a:buFont typeface="Arial" panose="020B0604020202020204" pitchFamily="34" charset="0"/>
+              <a:buChar char="•"/>
+            </a:pPr>
+            <a:r>
+              <a:rPr lang="es-EC" dirty="0"/>
+              <a:t>Prop </a:t>
+            </a:r>
+            <a:r>
+              <a:rPr lang="es-EC" dirty="0" err="1"/>
+              <a:t>drilling</a:t>
+            </a:r>
+            <a:r>
+              <a:rPr lang="es-EC" dirty="0"/>
+              <a:t>.</a:t>
+            </a:r>
+          </a:p>
+          <a:p>
+            <a:pPr marL="342900" indent="-342900" algn="l">
+              <a:buFont typeface="Arial" panose="020B0604020202020204" pitchFamily="34" charset="0"/>
+              <a:buChar char="•"/>
+            </a:pPr>
+            <a:r>
+              <a:rPr lang="es-EC" dirty="0"/>
+              <a:t>Modularizar el contexto de nuestra app.</a:t>
+            </a:r>
+          </a:p>
+          <a:p>
+            <a:pPr marL="342900" indent="-342900" algn="l">
+              <a:buFont typeface="Arial" panose="020B0604020202020204" pitchFamily="34" charset="0"/>
+              <a:buChar char="•"/>
+            </a:pPr>
+            <a:r>
+              <a:rPr lang="es-EC" dirty="0"/>
+              <a:t>Manejar peticiones asíncronas para actualizar el state.</a:t>
+            </a:r>
+          </a:p>
+        </p:txBody>
+      </p:sp>
+    </p:spTree>
+    <p:extLst>
+      <p:ext uri="{BB962C8B-B14F-4D97-AF65-F5344CB8AC3E}">
+        <p14:creationId xmlns:p14="http://schemas.microsoft.com/office/powerpoint/2010/main" val="2674540214"/>
+      </p:ext>
+    </p:extLst>
+  </p:cSld>
+  <p:clrMapOvr>
+    <a:masterClrMapping/>
+  </p:clrMapOvr>
+</p:sld>
+</file>
+
+<file path=ppt/slides/slide4.xml><?xml version="1.0" encoding="utf-8"?>
+<p:sld xmlns:a="http://schemas.openxmlformats.org/drawingml/2006/main" xmlns:r="http://schemas.openxmlformats.org/officeDocument/2006/relationships" xmlns:p="http://schemas.openxmlformats.org/presentationml/2006/main">
+  <p:cSld>
+    <p:spTree>
+      <p:nvGrpSpPr>
+        <p:cNvPr id="1" name=""/>
+        <p:cNvGrpSpPr/>
+        <p:nvPr/>
+      </p:nvGrpSpPr>
+      <p:grpSpPr>
+        <a:xfrm>
+          <a:off x="0" y="0"/>
+          <a:ext cx="0" cy="0"/>
+          <a:chOff x="0" y="0"/>
+          <a:chExt cx="0" cy="0"/>
+        </a:xfrm>
+      </p:grpSpPr>
+      <p:sp>
+        <p:nvSpPr>
+          <p:cNvPr id="2" name="Title 1">
+            <a:extLst>
+              <a:ext uri="{FF2B5EF4-FFF2-40B4-BE49-F238E27FC236}">
+                <a16:creationId xmlns:a16="http://schemas.microsoft.com/office/drawing/2014/main" id="{0406F6B7-C947-E94E-F6E3-E0225E5DF236}"/>
+              </a:ext>
+            </a:extLst>
+          </p:cNvPr>
+          <p:cNvSpPr>
+            <a:spLocks noGrp="1"/>
+          </p:cNvSpPr>
+          <p:nvPr>
+            <p:ph type="title"/>
+          </p:nvPr>
+        </p:nvSpPr>
+        <p:spPr/>
+        <p:txBody>
+          <a:bodyPr/>
+          <a:lstStyle/>
+          <a:p>
+            <a:r>
+              <a:rPr lang="en-US"/>
+              <a:t>Librerías</a:t>
+            </a:r>
+            <a:endParaRPr lang="es-EC" dirty="0"/>
+          </a:p>
+        </p:txBody>
+      </p:sp>
+      <p:pic>
+        <p:nvPicPr>
+          <p:cNvPr id="1026" name="Picture 2" descr="What On Earth Is Redux &amp; Why Should I Consider It For My React App? | by  Lukonde Mwila | Medium">
+            <a:extLst>
+              <a:ext uri="{FF2B5EF4-FFF2-40B4-BE49-F238E27FC236}">
+                <a16:creationId xmlns:a16="http://schemas.microsoft.com/office/drawing/2014/main" id="{AD8A2EBF-A6D7-66D3-D522-70C702382DC6}"/>
+              </a:ext>
+            </a:extLst>
+          </p:cNvPr>
+          <p:cNvPicPr>
+            <a:picLocks noChangeAspect="1" noChangeArrowheads="1"/>
+          </p:cNvPicPr>
+          <p:nvPr/>
+        </p:nvPicPr>
+        <p:blipFill>
+          <a:blip r:embed="rId2">
+            <a:extLst>
+              <a:ext uri="{28A0092B-C50C-407E-A947-70E740481C1C}">
+                <a14:useLocalDpi xmlns:a14="http://schemas.microsoft.com/office/drawing/2010/main" val="0"/>
+              </a:ext>
+            </a:extLst>
+          </a:blip>
+          <a:srcRect/>
+          <a:stretch>
+            <a:fillRect/>
+          </a:stretch>
+        </p:blipFill>
+        <p:spPr bwMode="auto">
+          <a:xfrm>
+            <a:off x="4407693" y="1740689"/>
+            <a:ext cx="3376614" cy="3376614"/>
+          </a:xfrm>
+          <a:prstGeom prst="rect">
+            <a:avLst/>
+          </a:prstGeom>
+          <a:noFill/>
+          <a:extLst>
+            <a:ext uri="{909E8E84-426E-40DD-AFC4-6F175D3DCCD1}">
+              <a14:hiddenFill xmlns:a14="http://schemas.microsoft.com/office/drawing/2010/main">
+                <a:solidFill>
+                  <a:srgbClr val="FFFFFF"/>
+                </a:solidFill>
+              </a14:hiddenFill>
+            </a:ext>
+          </a:extLst>
+        </p:spPr>
+      </p:pic>
+      <p:pic>
+        <p:nvPicPr>
+          <p:cNvPr id="1028" name="Picture 4">
+            <a:extLst>
+              <a:ext uri="{FF2B5EF4-FFF2-40B4-BE49-F238E27FC236}">
+                <a16:creationId xmlns:a16="http://schemas.microsoft.com/office/drawing/2014/main" id="{5C59C05C-0CC2-1F8C-A784-3106CFFCDDAC}"/>
+              </a:ext>
+            </a:extLst>
+          </p:cNvPr>
+          <p:cNvPicPr>
+            <a:picLocks noChangeAspect="1" noChangeArrowheads="1"/>
+          </p:cNvPicPr>
+          <p:nvPr/>
+        </p:nvPicPr>
+        <p:blipFill>
+          <a:blip r:embed="rId3">
+            <a:extLst>
+              <a:ext uri="{28A0092B-C50C-407E-A947-70E740481C1C}">
+                <a14:useLocalDpi xmlns:a14="http://schemas.microsoft.com/office/drawing/2010/main" val="0"/>
+              </a:ext>
+            </a:extLst>
+          </a:blip>
+          <a:srcRect/>
+          <a:stretch>
+            <a:fillRect/>
+          </a:stretch>
+        </p:blipFill>
+        <p:spPr bwMode="auto">
+          <a:xfrm>
+            <a:off x="838200" y="2433634"/>
+            <a:ext cx="2295525" cy="1990725"/>
+          </a:xfrm>
+          <a:prstGeom prst="rect">
+            <a:avLst/>
+          </a:prstGeom>
+          <a:noFill/>
+          <a:extLst>
+            <a:ext uri="{909E8E84-426E-40DD-AFC4-6F175D3DCCD1}">
+              <a14:hiddenFill xmlns:a14="http://schemas.microsoft.com/office/drawing/2010/main">
+                <a:solidFill>
+                  <a:srgbClr val="FFFFFF"/>
+                </a:solidFill>
+              </a14:hiddenFill>
+            </a:ext>
+          </a:extLst>
+        </p:spPr>
+      </p:pic>
+      <p:pic>
+        <p:nvPicPr>
+          <p:cNvPr id="1030" name="Picture 6" descr="Official Vector logo (SVG) #branding · pmndrs zustand · Discussion #1623 ·  GitHub">
+            <a:extLst>
+              <a:ext uri="{FF2B5EF4-FFF2-40B4-BE49-F238E27FC236}">
+                <a16:creationId xmlns:a16="http://schemas.microsoft.com/office/drawing/2014/main" id="{A71F4B0B-2A85-FFDF-174E-269DEE21E0A2}"/>
+              </a:ext>
+            </a:extLst>
+          </p:cNvPr>
+          <p:cNvPicPr>
+            <a:picLocks noChangeAspect="1" noChangeArrowheads="1"/>
+          </p:cNvPicPr>
+          <p:nvPr/>
+        </p:nvPicPr>
+        <p:blipFill>
+          <a:blip r:embed="rId4">
+            <a:extLst>
+              <a:ext uri="{28A0092B-C50C-407E-A947-70E740481C1C}">
+                <a14:useLocalDpi xmlns:a14="http://schemas.microsoft.com/office/drawing/2010/main" val="0"/>
+              </a:ext>
+            </a:extLst>
+          </a:blip>
+          <a:srcRect/>
+          <a:stretch>
+            <a:fillRect/>
+          </a:stretch>
+        </p:blipFill>
+        <p:spPr bwMode="auto">
+          <a:xfrm>
+            <a:off x="9004065" y="2254130"/>
+            <a:ext cx="2349735" cy="2349735"/>
+          </a:xfrm>
+          <a:prstGeom prst="rect">
+            <a:avLst/>
+          </a:prstGeom>
+          <a:noFill/>
+          <a:extLst>
+            <a:ext uri="{909E8E84-426E-40DD-AFC4-6F175D3DCCD1}">
+              <a14:hiddenFill xmlns:a14="http://schemas.microsoft.com/office/drawing/2010/main">
+                <a:solidFill>
+                  <a:srgbClr val="FFFFFF"/>
+                </a:solidFill>
+              </a14:hiddenFill>
+            </a:ext>
+          </a:extLst>
+        </p:spPr>
+      </p:pic>
+    </p:spTree>
+    <p:extLst>
+      <p:ext uri="{BB962C8B-B14F-4D97-AF65-F5344CB8AC3E}">
+        <p14:creationId xmlns:p14="http://schemas.microsoft.com/office/powerpoint/2010/main" val="2060273701"/>
       </p:ext>
     </p:extLst>
   </p:cSld>
@@ -4542,11 +4947,12 @@
 </file>
 
 <file path=customXml/item1.xml><?xml version="1.0" encoding="utf-8"?>
-<p:properties xmlns:p="http://schemas.microsoft.com/office/2006/metadata/properties" xmlns:xsi="http://www.w3.org/2001/XMLSchema-instance" xmlns:pc="http://schemas.microsoft.com/office/infopath/2007/PartnerControls">
-  <documentManagement>
-    <_activity xmlns="98b3f1ad-107c-497c-bb15-64aaebc89f52" xsi:nil="true"/>
-  </documentManagement>
-</p:properties>
+<?mso-contentType ?>
+<FormTemplates xmlns="http://schemas.microsoft.com/sharepoint/v3/contenttype/forms">
+  <Display>DocumentLibraryForm</Display>
+  <Edit>DocumentLibraryForm</Edit>
+  <New>DocumentLibraryForm</New>
+</FormTemplates>
 </file>
 
 <file path=customXml/item2.xml><?xml version="1.0" encoding="utf-8"?>
@@ -4797,27 +5203,17 @@
 </file>
 
 <file path=customXml/item3.xml><?xml version="1.0" encoding="utf-8"?>
-<?mso-contentType ?>
-<FormTemplates xmlns="http://schemas.microsoft.com/sharepoint/v3/contenttype/forms">
-  <Display>DocumentLibraryForm</Display>
-  <Edit>DocumentLibraryForm</Edit>
-  <New>DocumentLibraryForm</New>
-</FormTemplates>
+<p:properties xmlns:p="http://schemas.microsoft.com/office/2006/metadata/properties" xmlns:xsi="http://www.w3.org/2001/XMLSchema-instance" xmlns:pc="http://schemas.microsoft.com/office/infopath/2007/PartnerControls">
+  <documentManagement>
+    <_activity xmlns="98b3f1ad-107c-497c-bb15-64aaebc89f52" xsi:nil="true"/>
+  </documentManagement>
+</p:properties>
 </file>
 
 <file path=customXml/itemProps1.xml><?xml version="1.0" encoding="utf-8"?>
-<ds:datastoreItem xmlns:ds="http://schemas.openxmlformats.org/officeDocument/2006/customXml" ds:itemID="{EEC6291A-1BB8-4D31-80EF-6AAECF11ECF7}">
+<ds:datastoreItem xmlns:ds="http://schemas.openxmlformats.org/officeDocument/2006/customXml" ds:itemID="{F5C501D5-0101-419A-AFBB-D8F04111C142}">
   <ds:schemaRefs>
-    <ds:schemaRef ds:uri="a0690ee9-4047-4223-84b2-6b02f926f5d8"/>
-    <ds:schemaRef ds:uri="http://www.w3.org/XML/1998/namespace"/>
-    <ds:schemaRef ds:uri="http://schemas.microsoft.com/office/2006/metadata/properties"/>
-    <ds:schemaRef ds:uri="http://schemas.microsoft.com/office/2006/documentManagement/types"/>
-    <ds:schemaRef ds:uri="98b3f1ad-107c-497c-bb15-64aaebc89f52"/>
-    <ds:schemaRef ds:uri="http://purl.org/dc/elements/1.1/"/>
-    <ds:schemaRef ds:uri="http://purl.org/dc/dcmitype/"/>
-    <ds:schemaRef ds:uri="http://purl.org/dc/terms/"/>
-    <ds:schemaRef ds:uri="http://schemas.microsoft.com/office/infopath/2007/PartnerControls"/>
-    <ds:schemaRef ds:uri="http://schemas.openxmlformats.org/package/2006/metadata/core-properties"/>
+    <ds:schemaRef ds:uri="http://schemas.microsoft.com/sharepoint/v3/contenttype/forms"/>
   </ds:schemaRefs>
 </ds:datastoreItem>
 </file>
@@ -4842,9 +5238,18 @@
 </file>
 
 <file path=customXml/itemProps3.xml><?xml version="1.0" encoding="utf-8"?>
-<ds:datastoreItem xmlns:ds="http://schemas.openxmlformats.org/officeDocument/2006/customXml" ds:itemID="{F5C501D5-0101-419A-AFBB-D8F04111C142}">
+<ds:datastoreItem xmlns:ds="http://schemas.openxmlformats.org/officeDocument/2006/customXml" ds:itemID="{EEC6291A-1BB8-4D31-80EF-6AAECF11ECF7}">
   <ds:schemaRefs>
-    <ds:schemaRef ds:uri="http://schemas.microsoft.com/sharepoint/v3/contenttype/forms"/>
+    <ds:schemaRef ds:uri="a0690ee9-4047-4223-84b2-6b02f926f5d8"/>
+    <ds:schemaRef ds:uri="http://www.w3.org/XML/1998/namespace"/>
+    <ds:schemaRef ds:uri="http://schemas.microsoft.com/office/2006/metadata/properties"/>
+    <ds:schemaRef ds:uri="http://schemas.microsoft.com/office/2006/documentManagement/types"/>
+    <ds:schemaRef ds:uri="98b3f1ad-107c-497c-bb15-64aaebc89f52"/>
+    <ds:schemaRef ds:uri="http://purl.org/dc/elements/1.1/"/>
+    <ds:schemaRef ds:uri="http://purl.org/dc/dcmitype/"/>
+    <ds:schemaRef ds:uri="http://purl.org/dc/terms/"/>
+    <ds:schemaRef ds:uri="http://schemas.microsoft.com/office/infopath/2007/PartnerControls"/>
+    <ds:schemaRef ds:uri="http://schemas.openxmlformats.org/package/2006/metadata/core-properties"/>
   </ds:schemaRefs>
 </ds:datastoreItem>
 </file>
</xml_diff>